<commit_message>
files for sprint 3
</commit_message>
<xml_diff>
--- a/Demo_2_PowerPoint.pptx
+++ b/Demo_2_PowerPoint.pptx
@@ -207,7 +207,6 @@
           </a:p>
         </c:rich>
       </c:tx>
-      <c:layout/>
       <c:overlay val="0"/>
       <c:spPr>
         <a:noFill/>
@@ -310,25 +309,25 @@
                 <c:formatCode>General</c:formatCode>
                 <c:ptCount val="7"/>
                 <c:pt idx="0">
-                  <c:v>133.5</c:v>
+                  <c:v>204</c:v>
                 </c:pt>
                 <c:pt idx="1">
-                  <c:v>111.25</c:v>
+                  <c:v>181.75</c:v>
                 </c:pt>
                 <c:pt idx="2">
-                  <c:v>89</c:v>
+                  <c:v>159.5</c:v>
                 </c:pt>
                 <c:pt idx="3">
-                  <c:v>66.75</c:v>
+                  <c:v>137.25</c:v>
                 </c:pt>
                 <c:pt idx="4">
-                  <c:v>44.5</c:v>
+                  <c:v>115</c:v>
                 </c:pt>
                 <c:pt idx="5">
-                  <c:v>22.249999999999996</c:v>
+                  <c:v>92.75</c:v>
                 </c:pt>
                 <c:pt idx="6">
-                  <c:v>0</c:v>
+                  <c:v>70.5</c:v>
                 </c:pt>
               </c:numCache>
             </c:numRef>
@@ -336,7 +335,7 @@
           <c:smooth val="1"/>
           <c:extLst>
             <c:ext xmlns:c16="http://schemas.microsoft.com/office/drawing/2014/chart" uri="{C3380CC4-5D6E-409C-BE32-E72D297353CC}">
-              <c16:uniqueId val="{00000000-FDEF-4AEA-83F1-FD8089B555B1}"/>
+              <c16:uniqueId val="{00000000-2AC6-4585-948E-91F781DBE105}"/>
             </c:ext>
           </c:extLst>
         </c:ser>
@@ -407,13 +406,13 @@
                 <c:formatCode>General</c:formatCode>
                 <c:ptCount val="3"/>
                 <c:pt idx="0">
-                  <c:v>135.5</c:v>
+                  <c:v>204</c:v>
                 </c:pt>
                 <c:pt idx="1">
-                  <c:v>135.5</c:v>
+                  <c:v>204</c:v>
                 </c:pt>
                 <c:pt idx="2">
-                  <c:v>115.5</c:v>
+                  <c:v>175</c:v>
                 </c:pt>
               </c:numCache>
             </c:numRef>
@@ -421,7 +420,7 @@
           <c:smooth val="1"/>
           <c:extLst>
             <c:ext xmlns:c16="http://schemas.microsoft.com/office/drawing/2014/chart" uri="{C3380CC4-5D6E-409C-BE32-E72D297353CC}">
-              <c16:uniqueId val="{00000001-FDEF-4AEA-83F1-FD8089B555B1}"/>
+              <c16:uniqueId val="{00000001-2AC6-4585-948E-91F781DBE105}"/>
             </c:ext>
           </c:extLst>
         </c:ser>
@@ -455,6 +454,64 @@
               <a:effectLst/>
             </c:spPr>
           </c:marker>
+          <c:dLbls>
+            <c:spPr>
+              <a:noFill/>
+              <a:ln>
+                <a:noFill/>
+              </a:ln>
+              <a:effectLst/>
+            </c:spPr>
+            <c:txPr>
+              <a:bodyPr rot="0" spcFirstLastPara="1" vertOverflow="ellipsis" vert="horz" wrap="square" lIns="38100" tIns="19050" rIns="38100" bIns="19050" anchor="ctr" anchorCtr="1">
+                <a:spAutoFit/>
+              </a:bodyPr>
+              <a:lstStyle/>
+              <a:p>
+                <a:pPr>
+                  <a:defRPr sz="900" b="0" i="0" u="none" strike="noStrike" kern="1200" baseline="0">
+                    <a:solidFill>
+                      <a:schemeClr val="tx1">
+                        <a:lumMod val="75000"/>
+                        <a:lumOff val="25000"/>
+                      </a:schemeClr>
+                    </a:solidFill>
+                    <a:latin typeface="+mn-lt"/>
+                    <a:ea typeface="+mn-ea"/>
+                    <a:cs typeface="+mn-cs"/>
+                  </a:defRPr>
+                </a:pPr>
+                <a:endParaRPr lang="en-US"/>
+              </a:p>
+            </c:txPr>
+            <c:dLblPos val="t"/>
+            <c:showLegendKey val="0"/>
+            <c:showVal val="1"/>
+            <c:showCatName val="0"/>
+            <c:showSerName val="0"/>
+            <c:showPercent val="0"/>
+            <c:showBubbleSize val="0"/>
+            <c:showLeaderLines val="0"/>
+            <c:extLst>
+              <c:ext xmlns:c15="http://schemas.microsoft.com/office/drawing/2012/chart" uri="{CE6537A1-D6FC-4f65-9D91-7224C49458BB}">
+                <c15:showLeaderLines val="1"/>
+                <c15:leaderLines>
+                  <c:spPr>
+                    <a:ln w="9525" cap="flat" cmpd="sng" algn="ctr">
+                      <a:solidFill>
+                        <a:schemeClr val="tx1">
+                          <a:lumMod val="35000"/>
+                          <a:lumOff val="65000"/>
+                        </a:schemeClr>
+                      </a:solidFill>
+                      <a:round/>
+                    </a:ln>
+                    <a:effectLst/>
+                  </c:spPr>
+                </c15:leaderLines>
+              </c:ext>
+            </c:extLst>
+          </c:dLbls>
           <c:xVal>
             <c:numRef>
               <c:f>Sheet1!$C$2:$I$2</c:f>
@@ -487,10 +544,10 @@
           </c:xVal>
           <c:yVal>
             <c:numRef>
-              <c:f>Sheet1!$C$35:$E$35</c:f>
+              <c:f>Sheet1!$C$35:$F$35</c:f>
               <c:numCache>
                 <c:formatCode>General</c:formatCode>
-                <c:ptCount val="3"/>
+                <c:ptCount val="4"/>
                 <c:pt idx="0">
                   <c:v>0</c:v>
                 </c:pt>
@@ -498,7 +555,10 @@
                   <c:v>0</c:v>
                 </c:pt>
                 <c:pt idx="2">
-                  <c:v>10</c:v>
+                  <c:v>0</c:v>
+                </c:pt>
+                <c:pt idx="3">
+                  <c:v>24</c:v>
                 </c:pt>
               </c:numCache>
             </c:numRef>
@@ -506,7 +566,7 @@
           <c:smooth val="1"/>
           <c:extLst>
             <c:ext xmlns:c16="http://schemas.microsoft.com/office/drawing/2014/chart" uri="{C3380CC4-5D6E-409C-BE32-E72D297353CC}">
-              <c16:uniqueId val="{00000002-FDEF-4AEA-83F1-FD8089B555B1}"/>
+              <c16:uniqueId val="{00000002-2AC6-4585-948E-91F781DBE105}"/>
             </c:ext>
           </c:extLst>
         </c:ser>
@@ -574,7 +634,6 @@
               </a:p>
             </c:rich>
           </c:tx>
-          <c:layout/>
           <c:overlay val="0"/>
           <c:spPr>
             <a:noFill/>
@@ -692,7 +751,6 @@
               </a:p>
             </c:rich>
           </c:tx>
-          <c:layout/>
           <c:overlay val="0"/>
           <c:spPr>
             <a:noFill/>
@@ -773,7 +831,6 @@
     </c:plotArea>
     <c:legend>
       <c:legendPos val="r"/>
-      <c:layout/>
       <c:overlay val="0"/>
       <c:spPr>
         <a:noFill/>
@@ -805,7 +862,6 @@
     </c:legend>
     <c:plotVisOnly val="1"/>
     <c:dispBlanksAs val="gap"/>
-    <c:showDLblsOverMax val="0"/>
     <c:extLst>
       <c:ext xmlns:c16r3="http://schemas.microsoft.com/office/drawing/2017/03/chart" uri="{56B9EC1D-385E-4148-901F-78D8002777C0}">
         <c16r3:dataDisplayOptions16>
@@ -813,6 +869,7 @@
         </c16r3:dataDisplayOptions16>
       </c:ext>
     </c:extLst>
+    <c:showDLblsOverMax val="0"/>
   </c:chart>
   <c:spPr>
     <a:noFill/>
@@ -851,230 +908,11 @@
     </mc:Fallback>
   </mc:AlternateContent>
   <c:chart>
-    <c:title>
-      <c:layout/>
-      <c:overlay val="0"/>
-      <c:spPr>
-        <a:noFill/>
-        <a:ln>
-          <a:noFill/>
-        </a:ln>
-        <a:effectLst/>
-      </c:spPr>
-      <c:txPr>
-        <a:bodyPr rot="0" spcFirstLastPara="1" vertOverflow="ellipsis" vert="horz" wrap="square" anchor="ctr" anchorCtr="1"/>
-        <a:lstStyle/>
-        <a:p>
-          <a:pPr>
-            <a:defRPr sz="1400" b="0" i="0" u="none" strike="noStrike" kern="1200" spc="0" baseline="0">
-              <a:solidFill>
-                <a:schemeClr val="tx1">
-                  <a:lumMod val="65000"/>
-                  <a:lumOff val="35000"/>
-                </a:schemeClr>
-              </a:solidFill>
-              <a:latin typeface="+mn-lt"/>
-              <a:ea typeface="+mn-ea"/>
-              <a:cs typeface="+mn-cs"/>
-            </a:defRPr>
-          </a:pPr>
-          <a:endParaRPr lang="en-US"/>
-        </a:p>
-      </c:txPr>
-    </c:title>
     <c:autoTitleDeleted val="0"/>
     <c:plotArea>
       <c:layout/>
       <c:pieChart>
         <c:varyColors val="1"/>
-        <c:ser>
-          <c:idx val="0"/>
-          <c:order val="0"/>
-          <c:tx>
-            <c:v>Percentage Complete</c:v>
-          </c:tx>
-          <c:dPt>
-            <c:idx val="0"/>
-            <c:bubble3D val="0"/>
-            <c:spPr>
-              <a:solidFill>
-                <a:schemeClr val="accent1"/>
-              </a:solidFill>
-              <a:ln w="19050">
-                <a:solidFill>
-                  <a:schemeClr val="lt1"/>
-                </a:solidFill>
-              </a:ln>
-              <a:effectLst/>
-            </c:spPr>
-            <c:extLst>
-              <c:ext xmlns:c16="http://schemas.microsoft.com/office/drawing/2014/chart" uri="{C3380CC4-5D6E-409C-BE32-E72D297353CC}">
-                <c16:uniqueId val="{00000001-4831-4B40-86C8-55B12CAAAD6B}"/>
-              </c:ext>
-            </c:extLst>
-          </c:dPt>
-          <c:dPt>
-            <c:idx val="1"/>
-            <c:bubble3D val="0"/>
-            <c:spPr>
-              <a:solidFill>
-                <a:schemeClr val="accent2"/>
-              </a:solidFill>
-              <a:ln w="19050">
-                <a:solidFill>
-                  <a:schemeClr val="lt1"/>
-                </a:solidFill>
-              </a:ln>
-              <a:effectLst/>
-            </c:spPr>
-            <c:extLst>
-              <c:ext xmlns:c16="http://schemas.microsoft.com/office/drawing/2014/chart" uri="{C3380CC4-5D6E-409C-BE32-E72D297353CC}">
-                <c16:uniqueId val="{00000003-4831-4B40-86C8-55B12CAAAD6B}"/>
-              </c:ext>
-            </c:extLst>
-          </c:dPt>
-          <c:dPt>
-            <c:idx val="2"/>
-            <c:bubble3D val="0"/>
-            <c:spPr>
-              <a:solidFill>
-                <a:schemeClr val="accent3"/>
-              </a:solidFill>
-              <a:ln w="19050">
-                <a:solidFill>
-                  <a:schemeClr val="lt1"/>
-                </a:solidFill>
-              </a:ln>
-              <a:effectLst/>
-            </c:spPr>
-            <c:extLst>
-              <c:ext xmlns:c16="http://schemas.microsoft.com/office/drawing/2014/chart" uri="{C3380CC4-5D6E-409C-BE32-E72D297353CC}">
-                <c16:uniqueId val="{00000005-4831-4B40-86C8-55B12CAAAD6B}"/>
-              </c:ext>
-            </c:extLst>
-          </c:dPt>
-          <c:dPt>
-            <c:idx val="3"/>
-            <c:bubble3D val="0"/>
-            <c:spPr>
-              <a:solidFill>
-                <a:schemeClr val="accent4"/>
-              </a:solidFill>
-              <a:ln w="19050">
-                <a:solidFill>
-                  <a:schemeClr val="lt1"/>
-                </a:solidFill>
-              </a:ln>
-              <a:effectLst/>
-            </c:spPr>
-            <c:extLst>
-              <c:ext xmlns:c16="http://schemas.microsoft.com/office/drawing/2014/chart" uri="{C3380CC4-5D6E-409C-BE32-E72D297353CC}">
-                <c16:uniqueId val="{00000007-4831-4B40-86C8-55B12CAAAD6B}"/>
-              </c:ext>
-            </c:extLst>
-          </c:dPt>
-          <c:dLbls>
-            <c:spPr>
-              <a:noFill/>
-              <a:ln>
-                <a:noFill/>
-              </a:ln>
-              <a:effectLst/>
-            </c:spPr>
-            <c:txPr>
-              <a:bodyPr rot="0" spcFirstLastPara="1" vertOverflow="ellipsis" vert="horz" wrap="square" lIns="38100" tIns="19050" rIns="38100" bIns="19050" anchor="ctr" anchorCtr="1">
-                <a:spAutoFit/>
-              </a:bodyPr>
-              <a:lstStyle/>
-              <a:p>
-                <a:pPr>
-                  <a:defRPr sz="900" b="0" i="0" u="none" strike="noStrike" kern="1200" baseline="0">
-                    <a:solidFill>
-                      <a:schemeClr val="tx1">
-                        <a:lumMod val="75000"/>
-                        <a:lumOff val="25000"/>
-                      </a:schemeClr>
-                    </a:solidFill>
-                    <a:latin typeface="+mn-lt"/>
-                    <a:ea typeface="+mn-ea"/>
-                    <a:cs typeface="+mn-cs"/>
-                  </a:defRPr>
-                </a:pPr>
-                <a:endParaRPr lang="en-US"/>
-              </a:p>
-            </c:txPr>
-            <c:dLblPos val="bestFit"/>
-            <c:showLegendKey val="0"/>
-            <c:showVal val="1"/>
-            <c:showCatName val="0"/>
-            <c:showSerName val="0"/>
-            <c:showPercent val="0"/>
-            <c:showBubbleSize val="0"/>
-            <c:showLeaderLines val="1"/>
-            <c:leaderLines>
-              <c:spPr>
-                <a:ln w="9525" cap="flat" cmpd="sng" algn="ctr">
-                  <a:solidFill>
-                    <a:schemeClr val="tx1">
-                      <a:lumMod val="35000"/>
-                      <a:lumOff val="65000"/>
-                    </a:schemeClr>
-                  </a:solidFill>
-                  <a:round/>
-                </a:ln>
-                <a:effectLst/>
-              </c:spPr>
-            </c:leaderLines>
-            <c:extLst>
-              <c:ext xmlns:c15="http://schemas.microsoft.com/office/drawing/2012/chart" uri="{CE6537A1-D6FC-4f65-9D91-7224C49458BB}">
-                <c15:layout/>
-              </c:ext>
-            </c:extLst>
-          </c:dLbls>
-          <c:cat>
-            <c:strLit>
-              <c:ptCount val="4"/>
-              <c:pt idx="0">
-                <c:v>Not Done</c:v>
-              </c:pt>
-              <c:pt idx="1">
-                <c:v> [US7]</c:v>
-              </c:pt>
-              <c:pt idx="2">
-                <c:v>[US5]</c:v>
-              </c:pt>
-              <c:pt idx="3">
-                <c:v>[US4]</c:v>
-              </c:pt>
-            </c:strLit>
-          </c:cat>
-          <c:val>
-            <c:numRef>
-              <c:f>(Sheet1!$E$16,Sheet1!$E$9,Sheet1!$E$7,Sheet1!$E$6)</c:f>
-              <c:numCache>
-                <c:formatCode>General</c:formatCode>
-                <c:ptCount val="4"/>
-                <c:pt idx="0">
-                  <c:v>115.5</c:v>
-                </c:pt>
-                <c:pt idx="1">
-                  <c:v>8</c:v>
-                </c:pt>
-                <c:pt idx="2">
-                  <c:v>2</c:v>
-                </c:pt>
-                <c:pt idx="3">
-                  <c:v>10</c:v>
-                </c:pt>
-              </c:numCache>
-            </c:numRef>
-          </c:val>
-          <c:extLst>
-            <c:ext xmlns:c16="http://schemas.microsoft.com/office/drawing/2014/chart" uri="{C3380CC4-5D6E-409C-BE32-E72D297353CC}">
-              <c16:uniqueId val="{00000008-4831-4B40-86C8-55B12CAAAD6B}"/>
-            </c:ext>
-          </c:extLst>
-        </c:ser>
         <c:dLbls>
           <c:dLblPos val="bestFit"/>
           <c:showLegendKey val="0"/>
@@ -1083,7 +921,7 @@
           <c:showSerName val="0"/>
           <c:showPercent val="0"/>
           <c:showBubbleSize val="0"/>
-          <c:showLeaderLines val="1"/>
+          <c:showLeaderLines val="0"/>
         </c:dLbls>
         <c:firstSliceAng val="0"/>
       </c:pieChart>
@@ -1097,7 +935,6 @@
     </c:plotArea>
     <c:legend>
       <c:legendPos val="b"/>
-      <c:layout/>
       <c:overlay val="0"/>
       <c:spPr>
         <a:noFill/>
@@ -1129,7 +966,6 @@
     </c:legend>
     <c:plotVisOnly val="1"/>
     <c:dispBlanksAs val="gap"/>
-    <c:showDLblsOverMax val="0"/>
     <c:extLst>
       <c:ext xmlns:c16r3="http://schemas.microsoft.com/office/drawing/2017/03/chart" uri="{56B9EC1D-385E-4148-901F-78D8002777C0}">
         <c16r3:dataDisplayOptions16>
@@ -1137,11 +973,526 @@
         </c16r3:dataDisplayOptions16>
       </c:ext>
     </c:extLst>
+    <c:showDLblsOverMax val="0"/>
   </c:chart>
   <c:spPr>
     <a:noFill/>
     <a:ln>
       <a:noFill/>
+    </a:ln>
+    <a:effectLst/>
+  </c:spPr>
+  <c:txPr>
+    <a:bodyPr/>
+    <a:lstStyle/>
+    <a:p>
+      <a:pPr>
+        <a:defRPr/>
+      </a:pPr>
+      <a:endParaRPr lang="en-US"/>
+    </a:p>
+  </c:txPr>
+  <c:externalData r:id="rId3">
+    <c:autoUpdate val="0"/>
+  </c:externalData>
+</c:chartSpace>
+</file>
+
+<file path=ppt/charts/chart3.xml><?xml version="1.0" encoding="utf-8"?>
+<c:chartSpace xmlns:c="http://schemas.openxmlformats.org/drawingml/2006/chart" xmlns:a="http://schemas.openxmlformats.org/drawingml/2006/main" xmlns:r="http://schemas.openxmlformats.org/officeDocument/2006/relationships" xmlns:c16r2="http://schemas.microsoft.com/office/drawing/2015/06/chart">
+  <c:date1904 val="0"/>
+  <c:lang val="en-US"/>
+  <c:roundedCorners val="0"/>
+  <mc:AlternateContent xmlns:mc="http://schemas.openxmlformats.org/markup-compatibility/2006">
+    <mc:Choice xmlns:c14="http://schemas.microsoft.com/office/drawing/2007/8/2/chart" Requires="c14">
+      <c14:style val="102"/>
+    </mc:Choice>
+    <mc:Fallback>
+      <c:style val="2"/>
+    </mc:Fallback>
+  </mc:AlternateContent>
+  <c:chart>
+    <c:title>
+      <c:overlay val="0"/>
+      <c:spPr>
+        <a:noFill/>
+        <a:ln>
+          <a:noFill/>
+        </a:ln>
+        <a:effectLst/>
+      </c:spPr>
+      <c:txPr>
+        <a:bodyPr rot="0" spcFirstLastPara="1" vertOverflow="ellipsis" vert="horz" wrap="square" anchor="ctr" anchorCtr="1"/>
+        <a:lstStyle/>
+        <a:p>
+          <a:pPr>
+            <a:defRPr sz="1800" b="1" i="0" u="none" strike="noStrike" kern="1200" baseline="0">
+              <a:solidFill>
+                <a:schemeClr val="dk1">
+                  <a:lumMod val="75000"/>
+                  <a:lumOff val="25000"/>
+                </a:schemeClr>
+              </a:solidFill>
+              <a:latin typeface="+mn-lt"/>
+              <a:ea typeface="+mn-ea"/>
+              <a:cs typeface="+mn-cs"/>
+            </a:defRPr>
+          </a:pPr>
+          <a:endParaRPr lang="en-US"/>
+        </a:p>
+      </c:txPr>
+    </c:title>
+    <c:autoTitleDeleted val="0"/>
+    <c:plotArea>
+      <c:layout/>
+      <c:pieChart>
+        <c:varyColors val="1"/>
+        <c:ser>
+          <c:idx val="0"/>
+          <c:order val="0"/>
+          <c:tx>
+            <c:v>Percentage Complete</c:v>
+          </c:tx>
+          <c:dPt>
+            <c:idx val="0"/>
+            <c:bubble3D val="0"/>
+            <c:spPr>
+              <a:solidFill>
+                <a:schemeClr val="accent1"/>
+              </a:solidFill>
+              <a:ln>
+                <a:noFill/>
+              </a:ln>
+              <a:effectLst>
+                <a:outerShdw blurRad="254000" sx="102000" sy="102000" algn="ctr" rotWithShape="0">
+                  <a:prstClr val="black">
+                    <a:alpha val="20000"/>
+                  </a:prstClr>
+                </a:outerShdw>
+              </a:effectLst>
+            </c:spPr>
+            <c:extLst>
+              <c:ext xmlns:c16="http://schemas.microsoft.com/office/drawing/2014/chart" uri="{C3380CC4-5D6E-409C-BE32-E72D297353CC}">
+                <c16:uniqueId val="{00000001-F1EF-4F41-9999-7E0C6CB2A799}"/>
+              </c:ext>
+            </c:extLst>
+          </c:dPt>
+          <c:dPt>
+            <c:idx val="1"/>
+            <c:bubble3D val="0"/>
+            <c:spPr>
+              <a:solidFill>
+                <a:schemeClr val="accent2"/>
+              </a:solidFill>
+              <a:ln>
+                <a:noFill/>
+              </a:ln>
+              <a:effectLst>
+                <a:outerShdw blurRad="254000" sx="102000" sy="102000" algn="ctr" rotWithShape="0">
+                  <a:prstClr val="black">
+                    <a:alpha val="20000"/>
+                  </a:prstClr>
+                </a:outerShdw>
+              </a:effectLst>
+            </c:spPr>
+            <c:extLst>
+              <c:ext xmlns:c16="http://schemas.microsoft.com/office/drawing/2014/chart" uri="{C3380CC4-5D6E-409C-BE32-E72D297353CC}">
+                <c16:uniqueId val="{00000003-F1EF-4F41-9999-7E0C6CB2A799}"/>
+              </c:ext>
+            </c:extLst>
+          </c:dPt>
+          <c:dPt>
+            <c:idx val="2"/>
+            <c:bubble3D val="0"/>
+            <c:spPr>
+              <a:solidFill>
+                <a:schemeClr val="accent3"/>
+              </a:solidFill>
+              <a:ln>
+                <a:noFill/>
+              </a:ln>
+              <a:effectLst>
+                <a:outerShdw blurRad="254000" sx="102000" sy="102000" algn="ctr" rotWithShape="0">
+                  <a:prstClr val="black">
+                    <a:alpha val="20000"/>
+                  </a:prstClr>
+                </a:outerShdw>
+              </a:effectLst>
+            </c:spPr>
+            <c:extLst>
+              <c:ext xmlns:c16="http://schemas.microsoft.com/office/drawing/2014/chart" uri="{C3380CC4-5D6E-409C-BE32-E72D297353CC}">
+                <c16:uniqueId val="{00000005-F1EF-4F41-9999-7E0C6CB2A799}"/>
+              </c:ext>
+            </c:extLst>
+          </c:dPt>
+          <c:dPt>
+            <c:idx val="3"/>
+            <c:bubble3D val="0"/>
+            <c:spPr>
+              <a:solidFill>
+                <a:schemeClr val="accent4"/>
+              </a:solidFill>
+              <a:ln>
+                <a:noFill/>
+              </a:ln>
+              <a:effectLst>
+                <a:outerShdw blurRad="254000" sx="102000" sy="102000" algn="ctr" rotWithShape="0">
+                  <a:prstClr val="black">
+                    <a:alpha val="20000"/>
+                  </a:prstClr>
+                </a:outerShdw>
+              </a:effectLst>
+            </c:spPr>
+            <c:extLst>
+              <c:ext xmlns:c16="http://schemas.microsoft.com/office/drawing/2014/chart" uri="{C3380CC4-5D6E-409C-BE32-E72D297353CC}">
+                <c16:uniqueId val="{00000007-F1EF-4F41-9999-7E0C6CB2A799}"/>
+              </c:ext>
+            </c:extLst>
+          </c:dPt>
+          <c:dPt>
+            <c:idx val="4"/>
+            <c:bubble3D val="0"/>
+            <c:spPr>
+              <a:solidFill>
+                <a:schemeClr val="accent5"/>
+              </a:solidFill>
+              <a:ln>
+                <a:noFill/>
+              </a:ln>
+              <a:effectLst>
+                <a:outerShdw blurRad="254000" sx="102000" sy="102000" algn="ctr" rotWithShape="0">
+                  <a:prstClr val="black">
+                    <a:alpha val="20000"/>
+                  </a:prstClr>
+                </a:outerShdw>
+              </a:effectLst>
+            </c:spPr>
+            <c:extLst>
+              <c:ext xmlns:c16="http://schemas.microsoft.com/office/drawing/2014/chart" uri="{C3380CC4-5D6E-409C-BE32-E72D297353CC}">
+                <c16:uniqueId val="{00000009-F1EF-4F41-9999-7E0C6CB2A799}"/>
+              </c:ext>
+            </c:extLst>
+          </c:dPt>
+          <c:dPt>
+            <c:idx val="5"/>
+            <c:bubble3D val="0"/>
+            <c:spPr>
+              <a:solidFill>
+                <a:schemeClr val="accent6"/>
+              </a:solidFill>
+              <a:ln>
+                <a:noFill/>
+              </a:ln>
+              <a:effectLst>
+                <a:outerShdw blurRad="254000" sx="102000" sy="102000" algn="ctr" rotWithShape="0">
+                  <a:prstClr val="black">
+                    <a:alpha val="20000"/>
+                  </a:prstClr>
+                </a:outerShdw>
+              </a:effectLst>
+            </c:spPr>
+            <c:extLst>
+              <c:ext xmlns:c16="http://schemas.microsoft.com/office/drawing/2014/chart" uri="{C3380CC4-5D6E-409C-BE32-E72D297353CC}">
+                <c16:uniqueId val="{0000000B-F1EF-4F41-9999-7E0C6CB2A799}"/>
+              </c:ext>
+            </c:extLst>
+          </c:dPt>
+          <c:dPt>
+            <c:idx val="6"/>
+            <c:bubble3D val="0"/>
+            <c:spPr>
+              <a:solidFill>
+                <a:schemeClr val="accent1">
+                  <a:lumMod val="60000"/>
+                </a:schemeClr>
+              </a:solidFill>
+              <a:ln>
+                <a:noFill/>
+              </a:ln>
+              <a:effectLst>
+                <a:outerShdw blurRad="254000" sx="102000" sy="102000" algn="ctr" rotWithShape="0">
+                  <a:prstClr val="black">
+                    <a:alpha val="20000"/>
+                  </a:prstClr>
+                </a:outerShdw>
+              </a:effectLst>
+            </c:spPr>
+            <c:extLst>
+              <c:ext xmlns:c16="http://schemas.microsoft.com/office/drawing/2014/chart" uri="{C3380CC4-5D6E-409C-BE32-E72D297353CC}">
+                <c16:uniqueId val="{0000000D-F1EF-4F41-9999-7E0C6CB2A799}"/>
+              </c:ext>
+            </c:extLst>
+          </c:dPt>
+          <c:dPt>
+            <c:idx val="7"/>
+            <c:bubble3D val="0"/>
+            <c:spPr>
+              <a:solidFill>
+                <a:schemeClr val="accent2">
+                  <a:lumMod val="60000"/>
+                </a:schemeClr>
+              </a:solidFill>
+              <a:ln>
+                <a:noFill/>
+              </a:ln>
+              <a:effectLst>
+                <a:outerShdw blurRad="254000" sx="102000" sy="102000" algn="ctr" rotWithShape="0">
+                  <a:prstClr val="black">
+                    <a:alpha val="20000"/>
+                  </a:prstClr>
+                </a:outerShdw>
+              </a:effectLst>
+            </c:spPr>
+            <c:extLst>
+              <c:ext xmlns:c16="http://schemas.microsoft.com/office/drawing/2014/chart" uri="{C3380CC4-5D6E-409C-BE32-E72D297353CC}">
+                <c16:uniqueId val="{0000000F-F1EF-4F41-9999-7E0C6CB2A799}"/>
+              </c:ext>
+            </c:extLst>
+          </c:dPt>
+          <c:dPt>
+            <c:idx val="8"/>
+            <c:bubble3D val="0"/>
+            <c:spPr>
+              <a:solidFill>
+                <a:schemeClr val="accent3">
+                  <a:lumMod val="60000"/>
+                </a:schemeClr>
+              </a:solidFill>
+              <a:ln>
+                <a:noFill/>
+              </a:ln>
+              <a:effectLst>
+                <a:outerShdw blurRad="254000" sx="102000" sy="102000" algn="ctr" rotWithShape="0">
+                  <a:prstClr val="black">
+                    <a:alpha val="20000"/>
+                  </a:prstClr>
+                </a:outerShdw>
+              </a:effectLst>
+            </c:spPr>
+            <c:extLst>
+              <c:ext xmlns:c16="http://schemas.microsoft.com/office/drawing/2014/chart" uri="{C3380CC4-5D6E-409C-BE32-E72D297353CC}">
+                <c16:uniqueId val="{00000011-F1EF-4F41-9999-7E0C6CB2A799}"/>
+              </c:ext>
+            </c:extLst>
+          </c:dPt>
+          <c:dPt>
+            <c:idx val="9"/>
+            <c:bubble3D val="0"/>
+            <c:spPr>
+              <a:solidFill>
+                <a:schemeClr val="accent4">
+                  <a:lumMod val="60000"/>
+                </a:schemeClr>
+              </a:solidFill>
+              <a:ln>
+                <a:noFill/>
+              </a:ln>
+              <a:effectLst>
+                <a:outerShdw blurRad="254000" sx="102000" sy="102000" algn="ctr" rotWithShape="0">
+                  <a:prstClr val="black">
+                    <a:alpha val="20000"/>
+                  </a:prstClr>
+                </a:outerShdw>
+              </a:effectLst>
+            </c:spPr>
+            <c:extLst>
+              <c:ext xmlns:c16="http://schemas.microsoft.com/office/drawing/2014/chart" uri="{C3380CC4-5D6E-409C-BE32-E72D297353CC}">
+                <c16:uniqueId val="{00000013-F1EF-4F41-9999-7E0C6CB2A799}"/>
+              </c:ext>
+            </c:extLst>
+          </c:dPt>
+          <c:dLbls>
+            <c:spPr>
+              <a:pattFill prst="pct75">
+                <a:fgClr>
+                  <a:sysClr val="windowText" lastClr="000000">
+                    <a:lumMod val="75000"/>
+                    <a:lumOff val="25000"/>
+                  </a:sysClr>
+                </a:fgClr>
+                <a:bgClr>
+                  <a:sysClr val="windowText" lastClr="000000">
+                    <a:lumMod val="65000"/>
+                    <a:lumOff val="35000"/>
+                  </a:sysClr>
+                </a:bgClr>
+              </a:pattFill>
+              <a:ln>
+                <a:noFill/>
+              </a:ln>
+              <a:effectLst>
+                <a:outerShdw blurRad="50800" dist="38100" dir="2700000" algn="tl" rotWithShape="0">
+                  <a:prstClr val="black">
+                    <a:alpha val="40000"/>
+                  </a:prstClr>
+                </a:outerShdw>
+              </a:effectLst>
+            </c:spPr>
+            <c:txPr>
+              <a:bodyPr rot="0" spcFirstLastPara="1" vertOverflow="ellipsis" vert="horz" wrap="square" lIns="38100" tIns="19050" rIns="38100" bIns="19050" anchor="ctr" anchorCtr="1">
+                <a:spAutoFit/>
+              </a:bodyPr>
+              <a:lstStyle/>
+              <a:p>
+                <a:pPr>
+                  <a:defRPr sz="1000" b="1" i="0" u="none" strike="noStrike" kern="1200" baseline="0">
+                    <a:solidFill>
+                      <a:schemeClr val="lt1"/>
+                    </a:solidFill>
+                    <a:latin typeface="+mn-lt"/>
+                    <a:ea typeface="+mn-ea"/>
+                    <a:cs typeface="+mn-cs"/>
+                  </a:defRPr>
+                </a:pPr>
+                <a:endParaRPr lang="en-US"/>
+              </a:p>
+            </c:txPr>
+            <c:dLblPos val="bestFit"/>
+            <c:showLegendKey val="0"/>
+            <c:showVal val="1"/>
+            <c:showCatName val="0"/>
+            <c:showSerName val="0"/>
+            <c:showPercent val="0"/>
+            <c:showBubbleSize val="0"/>
+            <c:showLeaderLines val="1"/>
+            <c:leaderLines>
+              <c:spPr>
+                <a:ln w="9525">
+                  <a:solidFill>
+                    <a:schemeClr val="dk1">
+                      <a:lumMod val="50000"/>
+                      <a:lumOff val="50000"/>
+                    </a:schemeClr>
+                  </a:solidFill>
+                </a:ln>
+                <a:effectLst/>
+              </c:spPr>
+            </c:leaderLines>
+            <c:extLst>
+              <c:ext xmlns:c15="http://schemas.microsoft.com/office/drawing/2012/chart" uri="{CE6537A1-D6FC-4f65-9D91-7224C49458BB}"/>
+            </c:extLst>
+          </c:dLbls>
+          <c:cat>
+            <c:strLit>
+              <c:ptCount val="4"/>
+              <c:pt idx="0">
+                <c:v>Not Done</c:v>
+              </c:pt>
+              <c:pt idx="1">
+                <c:v> [US7]</c:v>
+              </c:pt>
+              <c:pt idx="2">
+                <c:v>[US5]</c:v>
+              </c:pt>
+              <c:pt idx="3">
+                <c:v>[US4]</c:v>
+              </c:pt>
+            </c:strLit>
+          </c:cat>
+          <c:val>
+            <c:numRef>
+              <c:f>(Sheet1!$E$6,Sheet1!$E$7,Sheet1!$E$9,Sheet1!$F$4,Sheet1!$F$3,Sheet1!$F$5,Sheet1!$F$6,Sheet1!$F$9,Sheet1!$F$13,Sheet1!$I$16)</c:f>
+              <c:numCache>
+                <c:formatCode>General</c:formatCode>
+                <c:ptCount val="10"/>
+                <c:pt idx="0">
+                  <c:v>15</c:v>
+                </c:pt>
+                <c:pt idx="1">
+                  <c:v>4</c:v>
+                </c:pt>
+                <c:pt idx="2">
+                  <c:v>10</c:v>
+                </c:pt>
+                <c:pt idx="3">
+                  <c:v>15</c:v>
+                </c:pt>
+                <c:pt idx="4">
+                  <c:v>2</c:v>
+                </c:pt>
+                <c:pt idx="5">
+                  <c:v>5</c:v>
+                </c:pt>
+                <c:pt idx="6">
+                  <c:v>8</c:v>
+                </c:pt>
+                <c:pt idx="7">
+                  <c:v>15</c:v>
+                </c:pt>
+                <c:pt idx="8">
+                  <c:v>15</c:v>
+                </c:pt>
+                <c:pt idx="9">
+                  <c:v>115</c:v>
+                </c:pt>
+              </c:numCache>
+            </c:numRef>
+          </c:val>
+          <c:extLst>
+            <c:ext xmlns:c16="http://schemas.microsoft.com/office/drawing/2014/chart" uri="{C3380CC4-5D6E-409C-BE32-E72D297353CC}">
+              <c16:uniqueId val="{00000014-F1EF-4F41-9999-7E0C6CB2A799}"/>
+            </c:ext>
+          </c:extLst>
+        </c:ser>
+        <c:dLbls>
+          <c:dLblPos val="bestFit"/>
+          <c:showLegendKey val="0"/>
+          <c:showVal val="1"/>
+          <c:showCatName val="0"/>
+          <c:showSerName val="0"/>
+          <c:showPercent val="0"/>
+          <c:showBubbleSize val="0"/>
+          <c:showLeaderLines val="1"/>
+        </c:dLbls>
+        <c:firstSliceAng val="0"/>
+      </c:pieChart>
+      <c:spPr>
+        <a:noFill/>
+        <a:ln>
+          <a:noFill/>
+        </a:ln>
+        <a:effectLst/>
+      </c:spPr>
+    </c:plotArea>
+    <c:plotVisOnly val="1"/>
+    <c:dispBlanksAs val="gap"/>
+    <c:extLst>
+      <c:ext xmlns:c16r3="http://schemas.microsoft.com/office/drawing/2017/03/chart" uri="{56B9EC1D-385E-4148-901F-78D8002777C0}">
+        <c16r3:dataDisplayOptions16>
+          <c16r3:dispNaAsBlank val="1"/>
+        </c16r3:dataDisplayOptions16>
+      </c:ext>
+    </c:extLst>
+    <c:showDLblsOverMax val="0"/>
+  </c:chart>
+  <c:spPr>
+    <a:gradFill flip="none" rotWithShape="1">
+      <a:gsLst>
+        <a:gs pos="0">
+          <a:schemeClr val="lt1"/>
+        </a:gs>
+        <a:gs pos="39000">
+          <a:schemeClr val="lt1"/>
+        </a:gs>
+        <a:gs pos="100000">
+          <a:schemeClr val="lt1">
+            <a:lumMod val="75000"/>
+          </a:schemeClr>
+        </a:gs>
+      </a:gsLst>
+      <a:path path="circle">
+        <a:fillToRect l="50000" t="-80000" r="50000" b="180000"/>
+      </a:path>
+      <a:tileRect/>
+    </a:gradFill>
+    <a:ln w="9525" cap="flat" cmpd="sng" algn="ctr">
+      <a:solidFill>
+        <a:schemeClr val="dk1">
+          <a:lumMod val="25000"/>
+          <a:lumOff val="75000"/>
+        </a:schemeClr>
+      </a:solidFill>
+      <a:round/>
     </a:ln>
     <a:effectLst/>
   </c:spPr>
@@ -1202,6 +1553,46 @@
 </file>
 
 <file path=ppt/charts/colors2.xml><?xml version="1.0" encoding="utf-8"?>
+<cs:colorStyle xmlns:cs="http://schemas.microsoft.com/office/drawing/2012/chartStyle" xmlns:a="http://schemas.openxmlformats.org/drawingml/2006/main" meth="cycle" id="10">
+  <a:schemeClr val="accent1"/>
+  <a:schemeClr val="accent2"/>
+  <a:schemeClr val="accent3"/>
+  <a:schemeClr val="accent4"/>
+  <a:schemeClr val="accent5"/>
+  <a:schemeClr val="accent6"/>
+  <cs:variation/>
+  <cs:variation>
+    <a:lumMod val="60000"/>
+  </cs:variation>
+  <cs:variation>
+    <a:lumMod val="80000"/>
+    <a:lumOff val="20000"/>
+  </cs:variation>
+  <cs:variation>
+    <a:lumMod val="80000"/>
+  </cs:variation>
+  <cs:variation>
+    <a:lumMod val="60000"/>
+    <a:lumOff val="40000"/>
+  </cs:variation>
+  <cs:variation>
+    <a:lumMod val="50000"/>
+  </cs:variation>
+  <cs:variation>
+    <a:lumMod val="70000"/>
+    <a:lumOff val="30000"/>
+  </cs:variation>
+  <cs:variation>
+    <a:lumMod val="70000"/>
+  </cs:variation>
+  <cs:variation>
+    <a:lumMod val="50000"/>
+    <a:lumOff val="50000"/>
+  </cs:variation>
+</cs:colorStyle>
+</file>
+
+<file path=ppt/charts/colors3.xml><?xml version="1.0" encoding="utf-8"?>
 <cs:colorStyle xmlns:cs="http://schemas.microsoft.com/office/drawing/2012/chartStyle" xmlns:a="http://schemas.openxmlformats.org/drawingml/2006/main" meth="cycle" id="10">
   <a:schemeClr val="accent1"/>
   <a:schemeClr val="accent2"/>
@@ -2276,6 +2667,607 @@
 </cs:chartStyle>
 </file>
 
+<file path=ppt/charts/style3.xml><?xml version="1.0" encoding="utf-8"?>
+<cs:chartStyle xmlns:cs="http://schemas.microsoft.com/office/drawing/2012/chartStyle" xmlns:a="http://schemas.openxmlformats.org/drawingml/2006/main" id="253">
+  <cs:axisTitle>
+    <cs:lnRef idx="0"/>
+    <cs:fillRef idx="0"/>
+    <cs:effectRef idx="0"/>
+    <cs:fontRef idx="minor">
+      <a:schemeClr val="dk1">
+        <a:lumMod val="75000"/>
+        <a:lumOff val="25000"/>
+      </a:schemeClr>
+    </cs:fontRef>
+    <cs:defRPr sz="900" b="1" kern="1200"/>
+  </cs:axisTitle>
+  <cs:categoryAxis>
+    <cs:lnRef idx="0"/>
+    <cs:fillRef idx="0"/>
+    <cs:effectRef idx="0"/>
+    <cs:fontRef idx="minor">
+      <a:schemeClr val="dk1">
+        <a:lumMod val="75000"/>
+        <a:lumOff val="25000"/>
+      </a:schemeClr>
+    </cs:fontRef>
+    <cs:spPr>
+      <a:ln w="19050" cap="flat" cmpd="sng" algn="ctr">
+        <a:solidFill>
+          <a:schemeClr val="dk1">
+            <a:lumMod val="75000"/>
+            <a:lumOff val="25000"/>
+          </a:schemeClr>
+        </a:solidFill>
+        <a:round/>
+      </a:ln>
+    </cs:spPr>
+    <cs:defRPr sz="900" kern="1200" cap="all" baseline="0"/>
+  </cs:categoryAxis>
+  <cs:chartArea>
+    <cs:lnRef idx="0"/>
+    <cs:fillRef idx="0"/>
+    <cs:effectRef idx="0"/>
+    <cs:fontRef idx="minor">
+      <a:schemeClr val="dk1"/>
+    </cs:fontRef>
+    <cs:spPr>
+      <a:gradFill flip="none" rotWithShape="1">
+        <a:gsLst>
+          <a:gs pos="0">
+            <a:schemeClr val="lt1"/>
+          </a:gs>
+          <a:gs pos="39000">
+            <a:schemeClr val="lt1"/>
+          </a:gs>
+          <a:gs pos="100000">
+            <a:schemeClr val="lt1">
+              <a:lumMod val="75000"/>
+            </a:schemeClr>
+          </a:gs>
+        </a:gsLst>
+        <a:path path="circle">
+          <a:fillToRect l="50000" t="-80000" r="50000" b="180000"/>
+        </a:path>
+        <a:tileRect/>
+      </a:gradFill>
+      <a:ln w="9525" cap="flat" cmpd="sng" algn="ctr">
+        <a:solidFill>
+          <a:schemeClr val="dk1">
+            <a:lumMod val="25000"/>
+            <a:lumOff val="75000"/>
+          </a:schemeClr>
+        </a:solidFill>
+        <a:round/>
+      </a:ln>
+    </cs:spPr>
+    <cs:defRPr sz="900" kern="1200"/>
+  </cs:chartArea>
+  <cs:dataLabel>
+    <cs:lnRef idx="0"/>
+    <cs:fillRef idx="0"/>
+    <cs:effectRef idx="0"/>
+    <cs:fontRef idx="minor">
+      <a:schemeClr val="lt1"/>
+    </cs:fontRef>
+    <cs:spPr>
+      <a:pattFill prst="pct75">
+        <a:fgClr>
+          <a:schemeClr val="dk1">
+            <a:lumMod val="75000"/>
+            <a:lumOff val="25000"/>
+          </a:schemeClr>
+        </a:fgClr>
+        <a:bgClr>
+          <a:schemeClr val="dk1">
+            <a:lumMod val="65000"/>
+            <a:lumOff val="35000"/>
+          </a:schemeClr>
+        </a:bgClr>
+      </a:pattFill>
+      <a:effectLst>
+        <a:outerShdw blurRad="50800" dist="38100" dir="2700000" algn="tl" rotWithShape="0">
+          <a:prstClr val="black">
+            <a:alpha val="40000"/>
+          </a:prstClr>
+        </a:outerShdw>
+      </a:effectLst>
+    </cs:spPr>
+    <cs:defRPr sz="1000" b="1" i="0" u="none" strike="noStrike" kern="1200" baseline="0"/>
+  </cs:dataLabel>
+  <cs:dataLabelCallout>
+    <cs:lnRef idx="0"/>
+    <cs:fillRef idx="0"/>
+    <cs:effectRef idx="0"/>
+    <cs:fontRef idx="minor">
+      <a:schemeClr val="lt1"/>
+    </cs:fontRef>
+    <cs:spPr>
+      <a:pattFill prst="pct75">
+        <a:fgClr>
+          <a:schemeClr val="dk1">
+            <a:lumMod val="75000"/>
+            <a:lumOff val="25000"/>
+          </a:schemeClr>
+        </a:fgClr>
+        <a:bgClr>
+          <a:schemeClr val="dk1">
+            <a:lumMod val="65000"/>
+            <a:lumOff val="35000"/>
+          </a:schemeClr>
+        </a:bgClr>
+      </a:pattFill>
+      <a:effectLst>
+        <a:outerShdw blurRad="50800" dist="38100" dir="2700000" algn="tl" rotWithShape="0">
+          <a:prstClr val="black">
+            <a:alpha val="40000"/>
+          </a:prstClr>
+        </a:outerShdw>
+      </a:effectLst>
+    </cs:spPr>
+    <cs:defRPr sz="1000" b="1" i="0" u="none" strike="noStrike" kern="1200" baseline="0"/>
+    <cs:bodyPr rot="0" spcFirstLastPara="1" vertOverflow="clip" horzOverflow="clip" vert="horz" wrap="square" lIns="36576" tIns="18288" rIns="36576" bIns="18288" anchor="ctr" anchorCtr="1">
+      <a:spAutoFit/>
+    </cs:bodyPr>
+  </cs:dataLabelCallout>
+  <cs:dataPoint>
+    <cs:lnRef idx="0"/>
+    <cs:fillRef idx="0">
+      <cs:styleClr val="auto"/>
+    </cs:fillRef>
+    <cs:effectRef idx="0"/>
+    <cs:fontRef idx="minor">
+      <a:schemeClr val="dk1"/>
+    </cs:fontRef>
+    <cs:spPr>
+      <a:solidFill>
+        <a:schemeClr val="phClr"/>
+      </a:solidFill>
+      <a:effectLst>
+        <a:outerShdw blurRad="254000" sx="102000" sy="102000" algn="ctr" rotWithShape="0">
+          <a:prstClr val="black">
+            <a:alpha val="20000"/>
+          </a:prstClr>
+        </a:outerShdw>
+      </a:effectLst>
+    </cs:spPr>
+  </cs:dataPoint>
+  <cs:dataPoint3D>
+    <cs:lnRef idx="0"/>
+    <cs:fillRef idx="0">
+      <cs:styleClr val="auto"/>
+    </cs:fillRef>
+    <cs:effectRef idx="0"/>
+    <cs:fontRef idx="minor">
+      <a:schemeClr val="dk1"/>
+    </cs:fontRef>
+    <cs:spPr>
+      <a:solidFill>
+        <a:schemeClr val="phClr"/>
+      </a:solidFill>
+      <a:effectLst>
+        <a:outerShdw blurRad="254000" sx="102000" sy="102000" algn="ctr" rotWithShape="0">
+          <a:prstClr val="black">
+            <a:alpha val="20000"/>
+          </a:prstClr>
+        </a:outerShdw>
+      </a:effectLst>
+    </cs:spPr>
+  </cs:dataPoint3D>
+  <cs:dataPointLine>
+    <cs:lnRef idx="0">
+      <cs:styleClr val="auto"/>
+    </cs:lnRef>
+    <cs:fillRef idx="0"/>
+    <cs:effectRef idx="0"/>
+    <cs:fontRef idx="minor">
+      <a:schemeClr val="dk1"/>
+    </cs:fontRef>
+    <cs:spPr>
+      <a:ln w="31750" cap="rnd">
+        <a:solidFill>
+          <a:schemeClr val="phClr">
+            <a:alpha val="85000"/>
+          </a:schemeClr>
+        </a:solidFill>
+        <a:round/>
+      </a:ln>
+    </cs:spPr>
+  </cs:dataPointLine>
+  <cs:dataPointMarker>
+    <cs:lnRef idx="0"/>
+    <cs:fillRef idx="0">
+      <cs:styleClr val="auto"/>
+    </cs:fillRef>
+    <cs:effectRef idx="0"/>
+    <cs:fontRef idx="minor">
+      <a:schemeClr val="dk1"/>
+    </cs:fontRef>
+    <cs:spPr>
+      <a:solidFill>
+        <a:schemeClr val="phClr">
+          <a:alpha val="85000"/>
+        </a:schemeClr>
+      </a:solidFill>
+    </cs:spPr>
+  </cs:dataPointMarker>
+  <cs:dataPointMarkerLayout symbol="circle" size="6"/>
+  <cs:dataPointWireframe>
+    <cs:lnRef idx="0">
+      <cs:styleClr val="auto"/>
+    </cs:lnRef>
+    <cs:fillRef idx="0"/>
+    <cs:effectRef idx="0"/>
+    <cs:fontRef idx="minor">
+      <a:schemeClr val="dk1"/>
+    </cs:fontRef>
+    <cs:spPr>
+      <a:ln w="9525" cap="rnd">
+        <a:solidFill>
+          <a:schemeClr val="phClr"/>
+        </a:solidFill>
+        <a:round/>
+      </a:ln>
+    </cs:spPr>
+  </cs:dataPointWireframe>
+  <cs:dataTable>
+    <cs:lnRef idx="0"/>
+    <cs:fillRef idx="0"/>
+    <cs:effectRef idx="0"/>
+    <cs:fontRef idx="minor">
+      <a:schemeClr val="dk1">
+        <a:lumMod val="75000"/>
+        <a:lumOff val="25000"/>
+      </a:schemeClr>
+    </cs:fontRef>
+    <cs:spPr>
+      <a:ln w="9525">
+        <a:solidFill>
+          <a:schemeClr val="dk1">
+            <a:lumMod val="35000"/>
+            <a:lumOff val="65000"/>
+          </a:schemeClr>
+        </a:solidFill>
+      </a:ln>
+    </cs:spPr>
+    <cs:defRPr sz="900" kern="1200"/>
+  </cs:dataTable>
+  <cs:downBar>
+    <cs:lnRef idx="0"/>
+    <cs:fillRef idx="0"/>
+    <cs:effectRef idx="0"/>
+    <cs:fontRef idx="minor">
+      <a:schemeClr val="dk1"/>
+    </cs:fontRef>
+    <cs:spPr>
+      <a:solidFill>
+        <a:schemeClr val="dk1">
+          <a:lumMod val="50000"/>
+          <a:lumOff val="50000"/>
+        </a:schemeClr>
+      </a:solidFill>
+      <a:ln w="9525">
+        <a:solidFill>
+          <a:schemeClr val="dk1">
+            <a:lumMod val="65000"/>
+            <a:lumOff val="35000"/>
+          </a:schemeClr>
+        </a:solidFill>
+      </a:ln>
+    </cs:spPr>
+  </cs:downBar>
+  <cs:dropLine>
+    <cs:lnRef idx="0"/>
+    <cs:fillRef idx="0"/>
+    <cs:effectRef idx="0"/>
+    <cs:fontRef idx="minor">
+      <a:schemeClr val="dk1"/>
+    </cs:fontRef>
+    <cs:spPr>
+      <a:ln w="9525">
+        <a:solidFill>
+          <a:schemeClr val="dk1">
+            <a:lumMod val="35000"/>
+            <a:lumOff val="65000"/>
+          </a:schemeClr>
+        </a:solidFill>
+        <a:prstDash val="dash"/>
+      </a:ln>
+    </cs:spPr>
+  </cs:dropLine>
+  <cs:errorBar>
+    <cs:lnRef idx="0"/>
+    <cs:fillRef idx="0"/>
+    <cs:effectRef idx="0"/>
+    <cs:fontRef idx="minor">
+      <a:schemeClr val="dk1"/>
+    </cs:fontRef>
+    <cs:spPr>
+      <a:ln w="9525">
+        <a:solidFill>
+          <a:schemeClr val="dk1">
+            <a:lumMod val="65000"/>
+            <a:lumOff val="35000"/>
+          </a:schemeClr>
+        </a:solidFill>
+        <a:round/>
+      </a:ln>
+    </cs:spPr>
+  </cs:errorBar>
+  <cs:floor>
+    <cs:lnRef idx="0"/>
+    <cs:fillRef idx="0"/>
+    <cs:effectRef idx="0"/>
+    <cs:fontRef idx="minor">
+      <a:schemeClr val="dk1"/>
+    </cs:fontRef>
+  </cs:floor>
+  <cs:gridlineMajor>
+    <cs:lnRef idx="0"/>
+    <cs:fillRef idx="0"/>
+    <cs:effectRef idx="0"/>
+    <cs:fontRef idx="minor">
+      <a:schemeClr val="dk1"/>
+    </cs:fontRef>
+    <cs:spPr>
+      <a:ln w="9525" cap="flat" cmpd="sng" algn="ctr">
+        <a:gradFill>
+          <a:gsLst>
+            <a:gs pos="100000">
+              <a:schemeClr val="dk1">
+                <a:lumMod val="95000"/>
+                <a:lumOff val="5000"/>
+                <a:alpha val="42000"/>
+              </a:schemeClr>
+            </a:gs>
+            <a:gs pos="0">
+              <a:schemeClr val="lt1">
+                <a:lumMod val="75000"/>
+                <a:alpha val="36000"/>
+              </a:schemeClr>
+            </a:gs>
+          </a:gsLst>
+          <a:lin ang="5400000" scaled="0"/>
+        </a:gradFill>
+        <a:round/>
+      </a:ln>
+    </cs:spPr>
+  </cs:gridlineMajor>
+  <cs:gridlineMinor>
+    <cs:lnRef idx="0"/>
+    <cs:fillRef idx="0"/>
+    <cs:effectRef idx="0"/>
+    <cs:fontRef idx="minor">
+      <a:schemeClr val="dk1"/>
+    </cs:fontRef>
+    <cs:spPr>
+      <a:ln>
+        <a:gradFill>
+          <a:gsLst>
+            <a:gs pos="100000">
+              <a:schemeClr val="dk1">
+                <a:lumMod val="95000"/>
+                <a:lumOff val="5000"/>
+                <a:alpha val="42000"/>
+              </a:schemeClr>
+            </a:gs>
+            <a:gs pos="0">
+              <a:schemeClr val="lt1">
+                <a:lumMod val="75000"/>
+                <a:alpha val="36000"/>
+              </a:schemeClr>
+            </a:gs>
+          </a:gsLst>
+          <a:lin ang="5400000" scaled="0"/>
+        </a:gradFill>
+      </a:ln>
+    </cs:spPr>
+  </cs:gridlineMinor>
+  <cs:hiLoLine>
+    <cs:lnRef idx="0"/>
+    <cs:fillRef idx="0"/>
+    <cs:effectRef idx="0"/>
+    <cs:fontRef idx="minor">
+      <a:schemeClr val="dk1"/>
+    </cs:fontRef>
+    <cs:spPr>
+      <a:ln w="9525">
+        <a:solidFill>
+          <a:schemeClr val="dk1">
+            <a:lumMod val="35000"/>
+            <a:lumOff val="65000"/>
+          </a:schemeClr>
+        </a:solidFill>
+        <a:prstDash val="dash"/>
+      </a:ln>
+    </cs:spPr>
+  </cs:hiLoLine>
+  <cs:leaderLine>
+    <cs:lnRef idx="0"/>
+    <cs:fillRef idx="0"/>
+    <cs:effectRef idx="0"/>
+    <cs:fontRef idx="minor">
+      <a:schemeClr val="dk1"/>
+    </cs:fontRef>
+    <cs:spPr>
+      <a:ln w="9525">
+        <a:solidFill>
+          <a:schemeClr val="dk1">
+            <a:lumMod val="50000"/>
+            <a:lumOff val="50000"/>
+          </a:schemeClr>
+        </a:solidFill>
+      </a:ln>
+    </cs:spPr>
+  </cs:leaderLine>
+  <cs:legend>
+    <cs:lnRef idx="0"/>
+    <cs:fillRef idx="0"/>
+    <cs:effectRef idx="0"/>
+    <cs:fontRef idx="minor">
+      <a:schemeClr val="dk1">
+        <a:lumMod val="75000"/>
+        <a:lumOff val="25000"/>
+      </a:schemeClr>
+    </cs:fontRef>
+    <cs:spPr>
+      <a:solidFill>
+        <a:schemeClr val="lt1">
+          <a:lumMod val="95000"/>
+          <a:alpha val="39000"/>
+        </a:schemeClr>
+      </a:solidFill>
+    </cs:spPr>
+    <cs:defRPr sz="900" kern="1200"/>
+  </cs:legend>
+  <cs:plotArea>
+    <cs:lnRef idx="0"/>
+    <cs:fillRef idx="0"/>
+    <cs:effectRef idx="0"/>
+    <cs:fontRef idx="minor">
+      <a:schemeClr val="dk1"/>
+    </cs:fontRef>
+  </cs:plotArea>
+  <cs:plotArea3D>
+    <cs:lnRef idx="0"/>
+    <cs:fillRef idx="0"/>
+    <cs:effectRef idx="0"/>
+    <cs:fontRef idx="minor">
+      <a:schemeClr val="dk1"/>
+    </cs:fontRef>
+  </cs:plotArea3D>
+  <cs:seriesAxis>
+    <cs:lnRef idx="0"/>
+    <cs:fillRef idx="0"/>
+    <cs:effectRef idx="0"/>
+    <cs:fontRef idx="minor">
+      <a:schemeClr val="dk1">
+        <a:lumMod val="75000"/>
+        <a:lumOff val="25000"/>
+      </a:schemeClr>
+    </cs:fontRef>
+    <cs:spPr>
+      <a:ln w="31750" cap="flat" cmpd="sng" algn="ctr">
+        <a:solidFill>
+          <a:schemeClr val="dk1">
+            <a:lumMod val="75000"/>
+            <a:lumOff val="25000"/>
+          </a:schemeClr>
+        </a:solidFill>
+        <a:round/>
+      </a:ln>
+    </cs:spPr>
+    <cs:defRPr sz="900" kern="1200"/>
+  </cs:seriesAxis>
+  <cs:seriesLine>
+    <cs:lnRef idx="0"/>
+    <cs:fillRef idx="0"/>
+    <cs:effectRef idx="0"/>
+    <cs:fontRef idx="minor">
+      <a:schemeClr val="dk1"/>
+    </cs:fontRef>
+    <cs:spPr>
+      <a:ln w="9525">
+        <a:solidFill>
+          <a:schemeClr val="dk1">
+            <a:lumMod val="50000"/>
+            <a:lumOff val="50000"/>
+          </a:schemeClr>
+        </a:solidFill>
+        <a:round/>
+      </a:ln>
+    </cs:spPr>
+  </cs:seriesLine>
+  <cs:title>
+    <cs:lnRef idx="0"/>
+    <cs:fillRef idx="0"/>
+    <cs:effectRef idx="0"/>
+    <cs:fontRef idx="minor">
+      <a:schemeClr val="dk1">
+        <a:lumMod val="75000"/>
+        <a:lumOff val="25000"/>
+      </a:schemeClr>
+    </cs:fontRef>
+    <cs:defRPr sz="1800" b="1" kern="1200" baseline="0"/>
+  </cs:title>
+  <cs:trendline>
+    <cs:lnRef idx="0">
+      <cs:styleClr val="auto"/>
+    </cs:lnRef>
+    <cs:fillRef idx="0"/>
+    <cs:effectRef idx="0"/>
+    <cs:fontRef idx="minor">
+      <a:schemeClr val="dk1"/>
+    </cs:fontRef>
+    <cs:spPr>
+      <a:ln w="19050" cap="rnd">
+        <a:solidFill>
+          <a:schemeClr val="phClr"/>
+        </a:solidFill>
+      </a:ln>
+    </cs:spPr>
+  </cs:trendline>
+  <cs:trendlineLabel>
+    <cs:lnRef idx="0"/>
+    <cs:fillRef idx="0"/>
+    <cs:effectRef idx="0"/>
+    <cs:fontRef idx="minor">
+      <a:schemeClr val="dk1">
+        <a:lumMod val="75000"/>
+        <a:lumOff val="25000"/>
+      </a:schemeClr>
+    </cs:fontRef>
+    <cs:defRPr sz="900" kern="1200"/>
+  </cs:trendlineLabel>
+  <cs:upBar>
+    <cs:lnRef idx="0"/>
+    <cs:fillRef idx="0"/>
+    <cs:effectRef idx="0"/>
+    <cs:fontRef idx="minor">
+      <a:schemeClr val="dk1"/>
+    </cs:fontRef>
+    <cs:spPr>
+      <a:solidFill>
+        <a:schemeClr val="lt1"/>
+      </a:solidFill>
+      <a:ln w="9525">
+        <a:solidFill>
+          <a:schemeClr val="dk1">
+            <a:lumMod val="65000"/>
+            <a:lumOff val="35000"/>
+          </a:schemeClr>
+        </a:solidFill>
+      </a:ln>
+    </cs:spPr>
+  </cs:upBar>
+  <cs:valueAxis>
+    <cs:lnRef idx="0"/>
+    <cs:fillRef idx="0"/>
+    <cs:effectRef idx="0"/>
+    <cs:fontRef idx="minor">
+      <a:schemeClr val="dk1">
+        <a:lumMod val="75000"/>
+        <a:lumOff val="25000"/>
+      </a:schemeClr>
+    </cs:fontRef>
+    <cs:spPr>
+      <a:ln>
+        <a:noFill/>
+      </a:ln>
+    </cs:spPr>
+    <cs:defRPr sz="900" kern="1200"/>
+  </cs:valueAxis>
+  <cs:wall>
+    <cs:lnRef idx="0"/>
+    <cs:fillRef idx="0"/>
+    <cs:effectRef idx="0"/>
+    <cs:fontRef idx="minor">
+      <a:schemeClr val="dk1"/>
+    </cs:fontRef>
+  </cs:wall>
+</cs:chartStyle>
+</file>
+
 <file path=ppt/handoutMasters/handoutMaster1.xml><?xml version="1.0" encoding="utf-8"?>
 <p:handoutMaster xmlns:a="http://schemas.openxmlformats.org/drawingml/2006/main" xmlns:r="http://schemas.openxmlformats.org/officeDocument/2006/relationships" xmlns:p="http://schemas.openxmlformats.org/presentationml/2006/main">
   <p:cSld>
@@ -2358,7 +3350,7 @@
           <a:p>
             <a:fld id="{BEA74EB7-856E-45FD-83F0-5F7C6F3E4372}" type="datetimeFigureOut">
               <a:rPr lang="en-US"/>
-              <a:t>4/6/2018</a:t>
+              <a:t>4/8/2018</a:t>
             </a:fld>
             <a:endParaRPr dirty="0"/>
           </a:p>
@@ -2523,7 +3515,7 @@
           <a:p>
             <a:fld id="{C61B0E40-8125-41F8-BB6C-139D8D531A4F}" type="datetimeFigureOut">
               <a:rPr lang="en-US"/>
-              <a:t>4/6/2018</a:t>
+              <a:t>4/8/2018</a:t>
             </a:fld>
             <a:endParaRPr dirty="0"/>
           </a:p>
@@ -3309,7 +4301,7 @@
           <a:p>
             <a:fld id="{333B76B7-5811-4114-8A95-998148FFD529}" type="datetime1">
               <a:rPr lang="en-US" smtClean="0"/>
-              <a:t>4/6/2018</a:t>
+              <a:t>4/8/2018</a:t>
             </a:fld>
             <a:endParaRPr lang="en-US" dirty="0"/>
           </a:p>
@@ -3665,7 +4657,7 @@
             <a:fld id="{5C6E67D0-0200-42BE-A0B2-78C70FBBB312}" type="datetime1">
               <a:rPr lang="en-US" smtClean="0"/>
               <a:pPr/>
-              <a:t>4/6/2018</a:t>
+              <a:t>4/8/2018</a:t>
             </a:fld>
             <a:endParaRPr lang="en-US" dirty="0"/>
           </a:p>
@@ -4073,7 +5065,7 @@
             <a:fld id="{5C6E67D0-0200-42BE-A0B2-78C70FBBB312}" type="datetime1">
               <a:rPr lang="en-US" smtClean="0"/>
               <a:pPr/>
-              <a:t>4/6/2018</a:t>
+              <a:t>4/8/2018</a:t>
             </a:fld>
             <a:endParaRPr lang="en-US" dirty="0"/>
           </a:p>
@@ -4416,7 +5408,7 @@
             <a:fld id="{5C6E67D0-0200-42BE-A0B2-78C70FBBB312}" type="datetime1">
               <a:rPr lang="en-US" smtClean="0"/>
               <a:pPr/>
-              <a:t>4/6/2018</a:t>
+              <a:t>4/8/2018</a:t>
             </a:fld>
             <a:endParaRPr lang="en-US" dirty="0"/>
           </a:p>
@@ -4743,7 +5735,7 @@
             <a:fld id="{5C6E67D0-0200-42BE-A0B2-78C70FBBB312}" type="datetime1">
               <a:rPr lang="en-US" smtClean="0"/>
               <a:pPr/>
-              <a:t>4/6/2018</a:t>
+              <a:t>4/8/2018</a:t>
             </a:fld>
             <a:endParaRPr lang="en-US" dirty="0"/>
           </a:p>
@@ -5146,7 +6138,7 @@
             <a:fld id="{5C6E67D0-0200-42BE-A0B2-78C70FBBB312}" type="datetime1">
               <a:rPr lang="en-US" smtClean="0"/>
               <a:pPr/>
-              <a:t>4/6/2018</a:t>
+              <a:t>4/8/2018</a:t>
             </a:fld>
             <a:endParaRPr lang="en-US" dirty="0"/>
           </a:p>
@@ -5409,7 +6401,7 @@
           <a:p>
             <a:fld id="{175C077A-EF7A-41AA-8976-110EB7416C60}" type="datetime1">
               <a:rPr lang="en-US" smtClean="0"/>
-              <a:t>4/6/2018</a:t>
+              <a:t>4/8/2018</a:t>
             </a:fld>
             <a:endParaRPr lang="en-US" dirty="0"/>
           </a:p>
@@ -5688,7 +6680,7 @@
           <a:p>
             <a:fld id="{CFF5912B-6681-4BDF-AE10-F59636249FF3}" type="datetime1">
               <a:rPr lang="en-US" smtClean="0"/>
-              <a:t>4/6/2018</a:t>
+              <a:t>4/8/2018</a:t>
             </a:fld>
             <a:endParaRPr lang="en-US" dirty="0"/>
           </a:p>
@@ -5985,7 +6977,7 @@
           <a:p>
             <a:fld id="{905C8E22-D0BA-4CB4-9C32-B27533199514}" type="datetime1">
               <a:rPr lang="en-US" smtClean="0"/>
-              <a:t>4/6/2018</a:t>
+              <a:t>4/8/2018</a:t>
             </a:fld>
             <a:endParaRPr dirty="0"/>
           </a:p>
@@ -6159,7 +7151,7 @@
           <a:p>
             <a:fld id="{FC2180A9-7A83-412D-A8AC-5AF60A8AA507}" type="datetime1">
               <a:rPr lang="en-US" smtClean="0"/>
-              <a:t>4/6/2018</a:t>
+              <a:t>4/8/2018</a:t>
             </a:fld>
             <a:endParaRPr lang="en-US" dirty="0"/>
           </a:p>
@@ -6505,7 +7497,7 @@
           <a:p>
             <a:fld id="{6A563DF0-FDDF-4143-9D8C-6AF41892E174}" type="datetime1">
               <a:rPr lang="en-US" smtClean="0"/>
-              <a:t>4/6/2018</a:t>
+              <a:t>4/8/2018</a:t>
             </a:fld>
             <a:endParaRPr lang="en-US" dirty="0"/>
           </a:p>
@@ -6845,7 +7837,7 @@
           <a:p>
             <a:fld id="{38BB83F9-4677-4C31-8407-7919061A580B}" type="datetime1">
               <a:rPr lang="en-US" smtClean="0"/>
-              <a:t>4/6/2018</a:t>
+              <a:t>4/8/2018</a:t>
             </a:fld>
             <a:endParaRPr lang="en-US" dirty="0"/>
           </a:p>
@@ -7319,7 +8311,7 @@
           <a:p>
             <a:fld id="{C33939A6-3450-434F-A872-BEE63F7EB093}" type="datetime1">
               <a:rPr lang="en-US" smtClean="0"/>
-              <a:t>4/6/2018</a:t>
+              <a:t>4/8/2018</a:t>
             </a:fld>
             <a:endParaRPr lang="en-US" dirty="0"/>
           </a:p>
@@ -7541,7 +8533,7 @@
           <a:p>
             <a:fld id="{E3BABB1C-FA00-4171-BA31-4C5E719472F3}" type="datetime1">
               <a:rPr lang="en-US" smtClean="0"/>
-              <a:t>4/6/2018</a:t>
+              <a:t>4/8/2018</a:t>
             </a:fld>
             <a:endParaRPr lang="en-US" dirty="0"/>
           </a:p>
@@ -7735,7 +8727,7 @@
           <a:p>
             <a:fld id="{D76C8610-5B57-4C6B-BF9F-F5397A1F60B8}" type="datetime1">
               <a:rPr lang="en-US" smtClean="0"/>
-              <a:t>4/6/2018</a:t>
+              <a:t>4/8/2018</a:t>
             </a:fld>
             <a:endParaRPr lang="en-US" dirty="0"/>
           </a:p>
@@ -8259,7 +9251,7 @@
           <a:p>
             <a:fld id="{BADBF3DD-8B6D-46AA-BCA9-242D4EF63DDF}" type="datetime1">
               <a:rPr lang="en-US" smtClean="0"/>
-              <a:t>4/6/2018</a:t>
+              <a:t>4/8/2018</a:t>
             </a:fld>
             <a:endParaRPr lang="en-US" dirty="0"/>
           </a:p>
@@ -8621,7 +9613,7 @@
           <a:p>
             <a:fld id="{23C41AE9-3D4A-4A08-B03D-DC6D2ADF5464}" type="datetime1">
               <a:rPr lang="en-US" smtClean="0"/>
-              <a:t>4/6/2018</a:t>
+              <a:t>4/8/2018</a:t>
             </a:fld>
             <a:endParaRPr lang="en-US" dirty="0"/>
           </a:p>
@@ -10756,7 +11748,7 @@
             <a:fld id="{5C6E67D0-0200-42BE-A0B2-78C70FBBB312}" type="datetime1">
               <a:rPr lang="en-US" smtClean="0"/>
               <a:pPr/>
-              <a:t>4/6/2018</a:t>
+              <a:t>4/8/2018</a:t>
             </a:fld>
             <a:endParaRPr lang="en-US" dirty="0"/>
           </a:p>
@@ -11311,10 +12303,6 @@
           <a:lstStyle/>
           <a:p>
             <a:pPr algn="ctr"/>
-            <a:r>
-              <a:rPr lang="en-US" dirty="0"/>
-              <a:t/>
-            </a:r>
             <a:br>
               <a:rPr lang="en-US" dirty="0"/>
             </a:br>
@@ -11422,7 +12410,7 @@
           <a:lstStyle/>
           <a:p>
             <a:r>
-              <a:rPr lang="en-US" sz="3600" dirty="0" smtClean="0"/>
+              <a:rPr lang="en-US" sz="3600" dirty="0"/>
               <a:t>User Stories</a:t>
             </a:r>
             <a:endParaRPr lang="en-US" sz="3500" dirty="0"/>
@@ -11453,99 +12441,62 @@
           <a:p>
             <a:r>
               <a:rPr lang="en-US" sz="3000" strike="sngStrike" dirty="0"/>
-              <a:t>[US]1 </a:t>
-            </a:r>
-            <a:r>
-              <a:rPr lang="en-US" sz="3000" strike="sngStrike" dirty="0" smtClean="0"/>
-              <a:t>As </a:t>
-            </a:r>
+              <a:t>[US]1 As a user, I can see the main view of the tracking application in order to detect and track movement of people.</a:t>
+            </a:r>
+          </a:p>
+          <a:p>
             <a:r>
               <a:rPr lang="en-US" sz="3000" strike="sngStrike" dirty="0"/>
-              <a:t>a user, I can see the main view of the tracking application in order to detect and track movement of people.</a:t>
-            </a:r>
-            <a:endParaRPr lang="en-US" sz="3000" strike="sngStrike" dirty="0" smtClean="0"/>
+              <a:t>[US]2 As a user, I can see how many cameras are configured from the main view.</a:t>
+            </a:r>
           </a:p>
           <a:p>
             <a:r>
               <a:rPr lang="en-US" sz="3000" strike="sngStrike" dirty="0"/>
-              <a:t>[</a:t>
-            </a:r>
-            <a:r>
-              <a:rPr lang="en-US" sz="3000" strike="sngStrike" dirty="0" smtClean="0"/>
-              <a:t>US]2 As </a:t>
-            </a:r>
-            <a:r>
-              <a:rPr lang="en-US" sz="3000" strike="sngStrike" dirty="0"/>
-              <a:t>a user, I can see how many cameras are configured from the main view.</a:t>
-            </a:r>
-            <a:endParaRPr lang="en-US" sz="3000" strike="sngStrike" dirty="0" smtClean="0"/>
-          </a:p>
-          <a:p>
-            <a:r>
-              <a:rPr lang="en-US" sz="3000" strike="sngStrike" dirty="0"/>
-              <a:t>[</a:t>
-            </a:r>
-            <a:r>
-              <a:rPr lang="en-US" sz="3000" strike="sngStrike" dirty="0" smtClean="0"/>
-              <a:t>US]3 As </a:t>
-            </a:r>
-            <a:r>
-              <a:rPr lang="en-US" sz="3000" strike="sngStrike" dirty="0"/>
-              <a:t>a user, each camera link can be clicked to see it's feed</a:t>
-            </a:r>
-            <a:endParaRPr lang="en-US" sz="3000" strike="sngStrike" dirty="0" smtClean="0"/>
+              <a:t>[US]3 As a user, each camera link can be clicked to see it's feed</a:t>
+            </a:r>
           </a:p>
           <a:p>
             <a:r>
               <a:rPr lang="en-US" sz="3000" b="1" dirty="0"/>
               <a:t>[US]4 As a user, movement of people will be displayed in the video with a label and a tracking rectangle in order to track people.</a:t>
             </a:r>
-            <a:endParaRPr lang="en-US" sz="3000" b="1" dirty="0" smtClean="0"/>
           </a:p>
           <a:p>
             <a:r>
               <a:rPr lang="en-US" sz="3000" strike="sngStrike" dirty="0"/>
               <a:t>[US]5 As a user, camera label and neighboring cameras can be seen from the main camera view screen.</a:t>
             </a:r>
-            <a:endParaRPr lang="en-US" sz="3000" strike="sngStrike" dirty="0" smtClean="0"/>
           </a:p>
           <a:p>
             <a:r>
               <a:rPr lang="en-US" sz="3000" strike="sngStrike" dirty="0"/>
               <a:t>[US]6 As a user on the main screen, I can see movement indicators on each camera.</a:t>
             </a:r>
-            <a:endParaRPr lang="en-US" sz="3000" strike="sngStrike" dirty="0" smtClean="0"/>
-          </a:p>
-          <a:p>
-            <a:r>
-              <a:rPr lang="en-US" sz="3000" dirty="0"/>
+          </a:p>
+          <a:p>
+            <a:r>
+              <a:rPr lang="en-US" sz="3000" b="1" dirty="0"/>
               <a:t>[US]7 As a movement tracking system, take control of a ELP mini USB camera and capture person movement information into a database.</a:t>
             </a:r>
-            <a:endParaRPr lang="en-US" sz="3000" dirty="0" smtClean="0"/>
-          </a:p>
-          <a:p>
-            <a:r>
-              <a:rPr lang="en-US" sz="3000" dirty="0"/>
-              <a:t>[US]8 As a user, I can see a textual log of movement activity</a:t>
-            </a:r>
-            <a:r>
-              <a:rPr lang="en-US" sz="3000" dirty="0" smtClean="0"/>
-              <a:t>.</a:t>
-            </a:r>
-          </a:p>
-          <a:p>
-            <a:r>
-              <a:rPr lang="en-US" sz="3000" dirty="0"/>
+          </a:p>
+          <a:p>
+            <a:r>
+              <a:rPr lang="en-US" sz="3000" b="1" dirty="0"/>
+              <a:t>[US]8 As a user, I can see a textual log of movement activity.</a:t>
+            </a:r>
+          </a:p>
+          <a:p>
+            <a:r>
+              <a:rPr lang="en-US" sz="3000" b="1" dirty="0"/>
               <a:t>[US]9 As a tracked person moving into a later camera, I can be labeled with an original label.</a:t>
             </a:r>
-            <a:endParaRPr lang="en-US" sz="3000" dirty="0" smtClean="0"/>
-          </a:p>
-          <a:p>
-            <a:r>
-              <a:rPr lang="en-US" sz="3000" dirty="0"/>
+          </a:p>
+          <a:p>
+            <a:r>
+              <a:rPr lang="en-US" sz="3000" b="1" dirty="0"/>
               <a:t>[US]10 As tracked people, multiple people can be tracked on the same or different cameras at the same time.</a:t>
             </a:r>
-            <a:endParaRPr lang="en-US" sz="3000" dirty="0" smtClean="0"/>
           </a:p>
           <a:p>
             <a:r>
@@ -11555,10 +12506,9 @@
           </a:p>
           <a:p>
             <a:r>
-              <a:rPr lang="en-US" sz="3000" dirty="0"/>
+              <a:rPr lang="en-US" sz="3000" b="1" dirty="0"/>
               <a:t>[US]12 As a movement tracking system, the program will work with a variable amount of cameras.</a:t>
             </a:r>
-            <a:endParaRPr lang="en-US" sz="3000" dirty="0" smtClean="0"/>
           </a:p>
         </p:txBody>
       </p:sp>
@@ -11620,10 +12570,9 @@
           <a:lstStyle/>
           <a:p>
             <a:r>
-              <a:rPr lang="en-US" dirty="0" smtClean="0"/>
+              <a:rPr lang="en-US" dirty="0"/>
               <a:t>Changes Since Last Demo</a:t>
             </a:r>
-            <a:endParaRPr lang="en-US" dirty="0"/>
           </a:p>
         </p:txBody>
       </p:sp>
@@ -11643,62 +12592,48 @@
           <a:lstStyle/>
           <a:p>
             <a:r>
-              <a:rPr lang="en-US" dirty="0" smtClean="0"/>
+              <a:rPr lang="en-US" dirty="0"/>
               <a:t>Setup database</a:t>
             </a:r>
           </a:p>
           <a:p>
             <a:r>
-              <a:rPr lang="en-US" dirty="0" smtClean="0"/>
+              <a:rPr lang="en-US" dirty="0"/>
               <a:t>Cameras automatically detected when plugged into device and is updated in the camera list</a:t>
             </a:r>
           </a:p>
           <a:p>
             <a:r>
-              <a:rPr lang="en-US" dirty="0" smtClean="0"/>
+              <a:rPr lang="en-US" dirty="0"/>
               <a:t>Clickable Camera navigation links</a:t>
             </a:r>
           </a:p>
           <a:p>
             <a:pPr lvl="1"/>
             <a:r>
-              <a:rPr lang="en-US" dirty="0" smtClean="0"/>
+              <a:rPr lang="en-US" dirty="0"/>
               <a:t>Neighboring cameras can be clicked on either side of the video feed</a:t>
             </a:r>
           </a:p>
           <a:p>
             <a:r>
-              <a:rPr lang="en-US" dirty="0" smtClean="0"/>
+              <a:rPr lang="en-US" dirty="0"/>
               <a:t>Motion detection icons</a:t>
             </a:r>
           </a:p>
           <a:p>
             <a:pPr lvl="1"/>
             <a:r>
-              <a:rPr lang="en-US" dirty="0" smtClean="0"/>
+              <a:rPr lang="en-US" dirty="0"/>
               <a:t>Red for no movement</a:t>
             </a:r>
           </a:p>
           <a:p>
             <a:pPr lvl="1"/>
             <a:r>
-              <a:rPr lang="en-US" dirty="0" smtClean="0"/>
-              <a:t>Yellow for predicted movement</a:t>
-            </a:r>
-          </a:p>
-          <a:p>
-            <a:pPr lvl="1"/>
-            <a:r>
-              <a:rPr lang="en-US" dirty="0" smtClean="0"/>
+              <a:rPr lang="en-US" dirty="0"/>
               <a:t>Green for current movement</a:t>
             </a:r>
-          </a:p>
-          <a:p>
-            <a:r>
-              <a:rPr lang="en-US" dirty="0" smtClean="0"/>
-              <a:t>Textual log of data read from database</a:t>
-            </a:r>
-            <a:endParaRPr lang="en-US" dirty="0"/>
           </a:p>
         </p:txBody>
       </p:sp>
@@ -11773,10 +12708,10 @@
       </p:sp>
       <p:pic>
         <p:nvPicPr>
-          <p:cNvPr id="2" name="Picture 1">
+          <p:cNvPr id="4" name="Picture 3">
             <a:extLst>
               <a:ext uri="{FF2B5EF4-FFF2-40B4-BE49-F238E27FC236}">
-                <a16:creationId xmlns:a16="http://schemas.microsoft.com/office/drawing/2014/main" id="{1869CB66-C2A0-4BFD-BFB0-D2E09629F953}"/>
+                <a16:creationId xmlns:a16="http://schemas.microsoft.com/office/drawing/2014/main" id="{2E7022B0-0A1E-431D-BDA1-4B060D6F1A03}"/>
               </a:ext>
             </a:extLst>
           </p:cNvPr>
@@ -11793,8 +12728,8 @@
         </p:blipFill>
         <p:spPr>
           <a:xfrm>
-            <a:off x="1522412" y="1038726"/>
-            <a:ext cx="10556088" cy="5588841"/>
+            <a:off x="531812" y="762000"/>
+            <a:ext cx="11430141" cy="6039689"/>
           </a:xfrm>
           <a:prstGeom prst="rect">
             <a:avLst/>
@@ -11869,7 +12804,7 @@
       </p:sp>
       <p:graphicFrame>
         <p:nvGraphicFramePr>
-          <p:cNvPr id="7" name="Chart 6">
+          <p:cNvPr id="4" name="Chart 3">
             <a:extLst>
               <a:ext uri="{FF2B5EF4-FFF2-40B4-BE49-F238E27FC236}">
                 <a16:creationId xmlns:a16="http://schemas.microsoft.com/office/drawing/2014/main" id="{0E59452C-46C9-4DCD-9F9B-DF24BC62FD5E}"/>
@@ -11882,14 +12817,14 @@
           <p:nvPr>
             <p:extLst>
               <p:ext uri="{D42A27DB-BD31-4B8C-83A1-F6EECF244321}">
-                <p14:modId xmlns:p14="http://schemas.microsoft.com/office/powerpoint/2010/main" val="1044187374"/>
+                <p14:modId xmlns:p14="http://schemas.microsoft.com/office/powerpoint/2010/main" val="2492291506"/>
               </p:ext>
             </p:extLst>
           </p:nvPr>
         </p:nvGraphicFramePr>
         <p:xfrm>
-          <a:off x="2284412" y="1264555"/>
-          <a:ext cx="9372600" cy="5105400"/>
+          <a:off x="2208212" y="1547813"/>
+          <a:ext cx="8534400" cy="4686077"/>
         </p:xfrm>
         <a:graphic>
           <a:graphicData uri="http://schemas.openxmlformats.org/drawingml/2006/chart">
@@ -11982,7 +12917,7 @@
           <p:nvPr>
             <p:extLst>
               <p:ext uri="{D42A27DB-BD31-4B8C-83A1-F6EECF244321}">
-                <p14:modId xmlns:p14="http://schemas.microsoft.com/office/powerpoint/2010/main" val="3456831311"/>
+                <p14:modId xmlns:p14="http://schemas.microsoft.com/office/powerpoint/2010/main" val="2023524922"/>
               </p:ext>
             </p:extLst>
           </p:nvPr>
@@ -11997,59 +12932,30 @@
           </a:graphicData>
         </a:graphic>
       </p:graphicFrame>
-      <p:sp>
-        <p:nvSpPr>
-          <p:cNvPr id="5" name="TextBox 4">
+      <p:graphicFrame>
+        <p:nvGraphicFramePr>
+          <p:cNvPr id="6" name="Chart 5">
             <a:extLst>
               <a:ext uri="{FF2B5EF4-FFF2-40B4-BE49-F238E27FC236}">
-                <a16:creationId xmlns:a16="http://schemas.microsoft.com/office/drawing/2014/main" id="{EB499C27-09CA-447F-8729-842D3435EC35}"/>
+                <a16:creationId xmlns:a16="http://schemas.microsoft.com/office/drawing/2014/main" id="{2E8D1547-84CF-40F9-8EE7-E9FEFD3979B6}"/>
               </a:ext>
             </a:extLst>
           </p:cNvPr>
-          <p:cNvSpPr txBox="1"/>
+          <p:cNvGraphicFramePr>
+            <a:graphicFrameLocks/>
+          </p:cNvGraphicFramePr>
           <p:nvPr/>
-        </p:nvSpPr>
-        <p:spPr>
-          <a:xfrm>
-            <a:off x="7923212" y="3529758"/>
-            <a:ext cx="2209800" cy="1200329"/>
-          </a:xfrm>
-          <a:prstGeom prst="rect">
-            <a:avLst/>
-          </a:prstGeom>
-          <a:noFill/>
-        </p:spPr>
-        <p:txBody>
-          <a:bodyPr wrap="square" rtlCol="0">
-            <a:spAutoFit/>
-          </a:bodyPr>
-          <a:lstStyle/>
-          <a:p>
-            <a:r>
-              <a:rPr lang="en-US" dirty="0"/>
-              <a:t>Not done: 85%</a:t>
-            </a:r>
-          </a:p>
-          <a:p>
-            <a:r>
-              <a:rPr lang="en-US" dirty="0"/>
-              <a:t>[US7]: 6%</a:t>
-            </a:r>
-          </a:p>
-          <a:p>
-            <a:r>
-              <a:rPr lang="en-US" dirty="0"/>
-              <a:t>[US5]: 2%</a:t>
-            </a:r>
-          </a:p>
-          <a:p>
-            <a:r>
-              <a:rPr lang="en-US" dirty="0"/>
-              <a:t>[US4]: 7%</a:t>
-            </a:r>
-          </a:p>
-        </p:txBody>
-      </p:sp>
+        </p:nvGraphicFramePr>
+        <p:xfrm>
+          <a:off x="2994025" y="1733550"/>
+          <a:ext cx="6200775" cy="3390900"/>
+        </p:xfrm>
+        <a:graphic>
+          <a:graphicData uri="http://schemas.openxmlformats.org/drawingml/2006/chart">
+            <c:chart xmlns:c="http://schemas.openxmlformats.org/drawingml/2006/chart" xmlns:r="http://schemas.openxmlformats.org/officeDocument/2006/relationships" r:id="rId3"/>
+          </a:graphicData>
+        </a:graphic>
+      </p:graphicFrame>
     </p:spTree>
     <p:extLst>
       <p:ext uri="{BB962C8B-B14F-4D97-AF65-F5344CB8AC3E}">

</xml_diff>